<commit_message>
update data and switch to use
</commit_message>
<xml_diff>
--- a/plots/SelectionRatio.pptx
+++ b/plots/SelectionRatio.pptx
@@ -259,7 +259,7 @@
           <a:p>
             <a:fld id="{487887E4-D7EA-314C-89CD-F8CC4B3CCD88}" type="datetimeFigureOut">
               <a:rPr lang="en-US" smtClean="0"/>
-              <a:t>5/30/21</a:t>
+              <a:t>6/1/21</a:t>
             </a:fld>
             <a:endParaRPr lang="en-US"/>
           </a:p>
@@ -457,7 +457,7 @@
           <a:p>
             <a:fld id="{487887E4-D7EA-314C-89CD-F8CC4B3CCD88}" type="datetimeFigureOut">
               <a:rPr lang="en-US" smtClean="0"/>
-              <a:t>5/30/21</a:t>
+              <a:t>6/1/21</a:t>
             </a:fld>
             <a:endParaRPr lang="en-US"/>
           </a:p>
@@ -665,7 +665,7 @@
           <a:p>
             <a:fld id="{487887E4-D7EA-314C-89CD-F8CC4B3CCD88}" type="datetimeFigureOut">
               <a:rPr lang="en-US" smtClean="0"/>
-              <a:t>5/30/21</a:t>
+              <a:t>6/1/21</a:t>
             </a:fld>
             <a:endParaRPr lang="en-US"/>
           </a:p>
@@ -863,7 +863,7 @@
           <a:p>
             <a:fld id="{487887E4-D7EA-314C-89CD-F8CC4B3CCD88}" type="datetimeFigureOut">
               <a:rPr lang="en-US" smtClean="0"/>
-              <a:t>5/30/21</a:t>
+              <a:t>6/1/21</a:t>
             </a:fld>
             <a:endParaRPr lang="en-US"/>
           </a:p>
@@ -1138,7 +1138,7 @@
           <a:p>
             <a:fld id="{487887E4-D7EA-314C-89CD-F8CC4B3CCD88}" type="datetimeFigureOut">
               <a:rPr lang="en-US" smtClean="0"/>
-              <a:t>5/30/21</a:t>
+              <a:t>6/1/21</a:t>
             </a:fld>
             <a:endParaRPr lang="en-US"/>
           </a:p>
@@ -1403,7 +1403,7 @@
           <a:p>
             <a:fld id="{487887E4-D7EA-314C-89CD-F8CC4B3CCD88}" type="datetimeFigureOut">
               <a:rPr lang="en-US" smtClean="0"/>
-              <a:t>5/30/21</a:t>
+              <a:t>6/1/21</a:t>
             </a:fld>
             <a:endParaRPr lang="en-US"/>
           </a:p>
@@ -1815,7 +1815,7 @@
           <a:p>
             <a:fld id="{487887E4-D7EA-314C-89CD-F8CC4B3CCD88}" type="datetimeFigureOut">
               <a:rPr lang="en-US" smtClean="0"/>
-              <a:t>5/30/21</a:t>
+              <a:t>6/1/21</a:t>
             </a:fld>
             <a:endParaRPr lang="en-US"/>
           </a:p>
@@ -1956,7 +1956,7 @@
           <a:p>
             <a:fld id="{487887E4-D7EA-314C-89CD-F8CC4B3CCD88}" type="datetimeFigureOut">
               <a:rPr lang="en-US" smtClean="0"/>
-              <a:t>5/30/21</a:t>
+              <a:t>6/1/21</a:t>
             </a:fld>
             <a:endParaRPr lang="en-US"/>
           </a:p>
@@ -2069,7 +2069,7 @@
           <a:p>
             <a:fld id="{487887E4-D7EA-314C-89CD-F8CC4B3CCD88}" type="datetimeFigureOut">
               <a:rPr lang="en-US" smtClean="0"/>
-              <a:t>5/30/21</a:t>
+              <a:t>6/1/21</a:t>
             </a:fld>
             <a:endParaRPr lang="en-US"/>
           </a:p>
@@ -2380,7 +2380,7 @@
           <a:p>
             <a:fld id="{487887E4-D7EA-314C-89CD-F8CC4B3CCD88}" type="datetimeFigureOut">
               <a:rPr lang="en-US" smtClean="0"/>
-              <a:t>5/30/21</a:t>
+              <a:t>6/1/21</a:t>
             </a:fld>
             <a:endParaRPr lang="en-US"/>
           </a:p>
@@ -2668,7 +2668,7 @@
           <a:p>
             <a:fld id="{487887E4-D7EA-314C-89CD-F8CC4B3CCD88}" type="datetimeFigureOut">
               <a:rPr lang="en-US" smtClean="0"/>
-              <a:t>5/30/21</a:t>
+              <a:t>6/1/21</a:t>
             </a:fld>
             <a:endParaRPr lang="en-US"/>
           </a:p>
@@ -2909,7 +2909,7 @@
           <a:p>
             <a:fld id="{487887E4-D7EA-314C-89CD-F8CC4B3CCD88}" type="datetimeFigureOut">
               <a:rPr lang="en-US" smtClean="0"/>
-              <a:t>5/30/21</a:t>
+              <a:t>6/1/21</a:t>
             </a:fld>
             <a:endParaRPr lang="en-US"/>
           </a:p>
@@ -3347,8 +3347,8 @@
         </p:blipFill>
         <p:spPr>
           <a:xfrm>
-            <a:off x="399393" y="0"/>
-            <a:ext cx="6568000" cy="6568000"/>
+            <a:off x="221729" y="186985"/>
+            <a:ext cx="7124037" cy="5936697"/>
           </a:xfrm>
           <a:prstGeom prst="rect">
             <a:avLst/>
@@ -3443,7 +3443,7 @@
         </p:blipFill>
         <p:spPr bwMode="auto">
           <a:xfrm>
-            <a:off x="4592019" y="5881311"/>
+            <a:off x="4729015" y="5584906"/>
             <a:ext cx="454454" cy="454454"/>
           </a:xfrm>
           <a:prstGeom prst="rect">
@@ -3510,7 +3510,7 @@
         </p:blipFill>
         <p:spPr bwMode="auto">
           <a:xfrm>
-            <a:off x="4882688" y="5748378"/>
+            <a:off x="5183469" y="5460817"/>
             <a:ext cx="1777860" cy="840987"/>
           </a:xfrm>
           <a:prstGeom prst="rect">
@@ -3577,7 +3577,7 @@
         </p:blipFill>
         <p:spPr bwMode="auto">
           <a:xfrm>
-            <a:off x="963255" y="5830028"/>
+            <a:off x="899303" y="5563712"/>
             <a:ext cx="1777860" cy="840987"/>
           </a:xfrm>
           <a:prstGeom prst="rect">
@@ -3624,7 +3624,7 @@
         </p:blipFill>
         <p:spPr bwMode="auto">
           <a:xfrm>
-            <a:off x="2816131" y="5883189"/>
+            <a:off x="2816131" y="5669553"/>
             <a:ext cx="454454" cy="454454"/>
           </a:xfrm>
           <a:prstGeom prst="rect">
@@ -3656,7 +3656,7 @@
         </p:nvSpPr>
         <p:spPr>
           <a:xfrm>
-            <a:off x="3043358" y="6404699"/>
+            <a:off x="3131617" y="6247771"/>
             <a:ext cx="1785745" cy="369332"/>
           </a:xfrm>
           <a:prstGeom prst="rect">

</xml_diff>